<commit_message>
Add video demo easyBackup VS FileZilla
</commit_message>
<xml_diff>
--- a/projects/easyBackup/easyBackupPresentation.pptx
+++ b/projects/easyBackup/easyBackupPresentation.pptx
@@ -15,6 +15,7 @@
     <p:sldId id="268" r:id="rId9"/>
     <p:sldId id="263" r:id="rId10"/>
     <p:sldId id="264" r:id="rId11"/>
+    <p:sldId id="269" r:id="rId12"/>
   </p:sldIdLst>
   <p:sldSz cx="9144000" cy="6858000" type="screen4x3"/>
   <p:notesSz cx="6858000" cy="9144000"/>
@@ -9535,21 +9536,8 @@
                   <a:schemeClr val="accent3"/>
                 </a:solidFill>
               </a:rPr>
-              <a:t>Remote the OVH scripts from a local script (to let users run manually the scripts without being connected to OVH) and download files locally from the </a:t>
-            </a:r>
-            <a:r>
-              <a:rPr lang="en-US" dirty="0" smtClean="0">
-                <a:solidFill>
-                  <a:schemeClr val="accent3"/>
-                </a:solidFill>
-              </a:rPr>
-              <a:t>server (DONE)</a:t>
-            </a:r>
-            <a:endParaRPr lang="en-US" dirty="0" smtClean="0">
-              <a:solidFill>
-                <a:schemeClr val="accent3"/>
-              </a:solidFill>
-            </a:endParaRPr>
+              <a:t>Remote the OVH scripts from a local script (to let users run manually the scripts without being connected to OVH) and download files locally from the server (DONE)</a:t>
+            </a:r>
           </a:p>
           <a:p>
             <a:pPr lvl="1"/>
@@ -9576,60 +9564,175 @@
           </a:p>
         </p:txBody>
       </p:sp>
-      <p:sp>
-        <p:nvSpPr>
-          <p:cNvPr id="4" name="TextBox 3"/>
-          <p:cNvSpPr txBox="1"/>
-          <p:nvPr/>
-        </p:nvSpPr>
-        <p:spPr>
-          <a:xfrm>
-            <a:off x="498474" y="5812039"/>
-            <a:ext cx="7475712" cy="707886"/>
-          </a:xfrm>
-          <a:prstGeom prst="rect">
-            <a:avLst/>
-          </a:prstGeom>
-          <a:noFill/>
-        </p:spPr>
-        <p:txBody>
-          <a:bodyPr wrap="square" rtlCol="0">
-            <a:spAutoFit/>
-          </a:bodyPr>
-          <a:lstStyle/>
-          <a:p>
-            <a:pPr algn="ctr"/>
-            <a:r>
-              <a:rPr lang="en-US" sz="2000" dirty="0" smtClean="0">
+    </p:spTree>
+    <p:extLst>
+      <p:ext uri="{BB962C8B-B14F-4D97-AF65-F5344CB8AC3E}">
+        <p14:creationId xmlns:p14="http://schemas.microsoft.com/office/powerpoint/2010/main" val="2034318941"/>
+      </p:ext>
+    </p:extLst>
+  </p:cSld>
+  <p:clrMapOvr>
+    <a:masterClrMapping/>
+  </p:clrMapOvr>
+</p:sld>
+</file>
+
+<file path=ppt/slides/slide11.xml><?xml version="1.0" encoding="utf-8"?>
+<p:sld xmlns:a="http://schemas.openxmlformats.org/drawingml/2006/main" xmlns:r="http://schemas.openxmlformats.org/officeDocument/2006/relationships" xmlns:p="http://schemas.openxmlformats.org/presentationml/2006/main">
+  <p:cSld>
+    <p:spTree>
+      <p:nvGrpSpPr>
+        <p:cNvPr id="1" name=""/>
+        <p:cNvGrpSpPr/>
+        <p:nvPr/>
+      </p:nvGrpSpPr>
+      <p:grpSpPr>
+        <a:xfrm>
+          <a:off x="0" y="0"/>
+          <a:ext cx="0" cy="0"/>
+          <a:chOff x="0" y="0"/>
+          <a:chExt cx="0" cy="0"/>
+        </a:xfrm>
+      </p:grpSpPr>
+      <p:sp>
+        <p:nvSpPr>
+          <p:cNvPr id="2" name="Title 1"/>
+          <p:cNvSpPr>
+            <a:spLocks noGrp="1"/>
+          </p:cNvSpPr>
+          <p:nvPr>
+            <p:ph type="title"/>
+          </p:nvPr>
+        </p:nvSpPr>
+        <p:spPr/>
+        <p:txBody>
+          <a:bodyPr/>
+          <a:lstStyle/>
+          <a:p>
+            <a:r>
+              <a:rPr lang="en-US" dirty="0" smtClean="0"/>
+              <a:t>Thank you</a:t>
+            </a:r>
+            <a:endParaRPr lang="en-US" dirty="0"/>
+          </a:p>
+        </p:txBody>
+      </p:sp>
+      <p:sp>
+        <p:nvSpPr>
+          <p:cNvPr id="3" name="Content Placeholder 2"/>
+          <p:cNvSpPr>
+            <a:spLocks noGrp="1"/>
+          </p:cNvSpPr>
+          <p:nvPr>
+            <p:ph idx="1"/>
+          </p:nvPr>
+        </p:nvSpPr>
+        <p:spPr/>
+        <p:txBody>
+          <a:bodyPr/>
+          <a:lstStyle/>
+          <a:p>
+            <a:pPr marL="0" indent="0" algn="ctr">
+              <a:buNone/>
+            </a:pPr>
+            <a:r>
+              <a:rPr lang="en-US" dirty="0">
                 <a:solidFill>
                   <a:schemeClr val="accent1"/>
                 </a:solidFill>
               </a:rPr>
-              <a:t>Do not forget to see our video demonstration !</a:t>
-            </a:r>
-          </a:p>
-          <a:p>
-            <a:pPr algn="ctr"/>
-            <a:r>
-              <a:rPr lang="en-US" sz="2000" dirty="0" smtClean="0">
+              <a:t>Do not forget to see our video demonstration about easyBackup VS FileZilla </a:t>
+            </a:r>
+            <a:r>
+              <a:rPr lang="en-US" dirty="0" smtClean="0">
                 <a:solidFill>
                   <a:schemeClr val="accent1"/>
                 </a:solidFill>
               </a:rPr>
-              <a:t>- Thanks -</a:t>
-            </a:r>
-            <a:endParaRPr lang="en-US" sz="2000" dirty="0">
+              <a:t>(on </a:t>
+            </a:r>
+            <a:r>
+              <a:rPr lang="en-US" dirty="0">
+                <a:solidFill>
+                  <a:schemeClr val="accent1"/>
+                </a:solidFill>
+              </a:rPr>
+              <a:t>G</a:t>
+            </a:r>
+            <a:r>
+              <a:rPr lang="en-US" dirty="0" smtClean="0">
+                <a:solidFill>
+                  <a:schemeClr val="accent1"/>
+                </a:solidFill>
+              </a:rPr>
+              <a:t>ithub) !</a:t>
+            </a:r>
+            <a:endParaRPr lang="en-US" dirty="0">
               <a:solidFill>
                 <a:schemeClr val="accent1"/>
               </a:solidFill>
             </a:endParaRPr>
           </a:p>
+          <a:p>
+            <a:pPr marL="0" indent="0" algn="ctr">
+              <a:buNone/>
+            </a:pPr>
+            <a:endParaRPr lang="en-US" dirty="0" smtClean="0">
+              <a:solidFill>
+                <a:schemeClr val="accent1"/>
+              </a:solidFill>
+            </a:endParaRPr>
+          </a:p>
+          <a:p>
+            <a:pPr marL="0" indent="0" algn="ctr">
+              <a:buNone/>
+            </a:pPr>
+            <a:endParaRPr lang="en-US" dirty="0">
+              <a:solidFill>
+                <a:schemeClr val="accent1"/>
+              </a:solidFill>
+            </a:endParaRPr>
+          </a:p>
+          <a:p>
+            <a:pPr marL="0" indent="0" algn="ctr">
+              <a:buNone/>
+            </a:pPr>
+            <a:endParaRPr lang="en-US" dirty="0" smtClean="0">
+              <a:solidFill>
+                <a:schemeClr val="accent1"/>
+              </a:solidFill>
+            </a:endParaRPr>
+          </a:p>
+          <a:p>
+            <a:pPr marL="0" indent="0" algn="ctr">
+              <a:buNone/>
+            </a:pPr>
+            <a:r>
+              <a:rPr lang="en-US" dirty="0" smtClean="0">
+                <a:solidFill>
+                  <a:schemeClr val="accent1"/>
+                </a:solidFill>
+              </a:rPr>
+              <a:t>- </a:t>
+            </a:r>
+            <a:r>
+              <a:rPr lang="en-US" dirty="0">
+                <a:solidFill>
+                  <a:schemeClr val="accent1"/>
+                </a:solidFill>
+              </a:rPr>
+              <a:t>Thanks -</a:t>
+            </a:r>
+          </a:p>
+          <a:p>
+            <a:endParaRPr lang="en-US" dirty="0"/>
+          </a:p>
         </p:txBody>
       </p:sp>
     </p:spTree>
     <p:extLst>
       <p:ext uri="{BB962C8B-B14F-4D97-AF65-F5344CB8AC3E}">
-        <p14:creationId xmlns:p14="http://schemas.microsoft.com/office/powerpoint/2010/main" val="2034318941"/>
+        <p14:creationId xmlns:p14="http://schemas.microsoft.com/office/powerpoint/2010/main" val="642771234"/>
       </p:ext>
     </p:extLst>
   </p:cSld>
@@ -9999,15 +10102,7 @@
           <a:p>
             <a:r>
               <a:rPr lang="en-US" dirty="0" smtClean="0"/>
-              <a:t>Script to </a:t>
-            </a:r>
-            <a:r>
-              <a:rPr lang="en-US" dirty="0" smtClean="0"/>
-              <a:t>synchronize </a:t>
-            </a:r>
-            <a:r>
-              <a:rPr lang="en-US" dirty="0" smtClean="0"/>
-              <a:t>folders</a:t>
+              <a:t>Script to synchronize folders</a:t>
             </a:r>
             <a:endParaRPr lang="en-US" dirty="0"/>
           </a:p>
@@ -10113,11 +10208,7 @@
           <a:p>
             <a:r>
               <a:rPr lang="en-US" noProof="1" smtClean="0"/>
-              <a:t>Optional : save </a:t>
-            </a:r>
-            <a:r>
-              <a:rPr lang="en-US" noProof="1" smtClean="0"/>
-              <a:t>logs reports (including errors) in a separate </a:t>
+              <a:t>Optional : save logs reports (including errors) in a separate </a:t>
             </a:r>
             <a:r>
               <a:rPr lang="en-US" noProof="1" smtClean="0">
@@ -10220,11 +10311,7 @@
           <a:p>
             <a:r>
               <a:rPr lang="en-US" dirty="0" smtClean="0"/>
-              <a:t>Initialize </a:t>
-            </a:r>
-            <a:r>
-              <a:rPr lang="en-US" dirty="0" smtClean="0"/>
-              <a:t>the variables</a:t>
+              <a:t>Initialize the variables</a:t>
             </a:r>
             <a:br>
               <a:rPr lang="en-US" dirty="0" smtClean="0"/>
@@ -10322,15 +10409,7 @@
                   <a:srgbClr val="595959"/>
                 </a:solidFill>
               </a:rPr>
-              <a:t>efine </a:t>
-            </a:r>
-            <a:r>
-              <a:rPr lang="en-US" dirty="0" smtClean="0">
-                <a:solidFill>
-                  <a:srgbClr val="595959"/>
-                </a:solidFill>
-              </a:rPr>
-              <a:t>in a variable a folder in which to save the BDD dumb</a:t>
+              <a:t>efine in a variable a folder in which to save the BDD dumb</a:t>
             </a:r>
             <a:br>
               <a:rPr lang="en-US" dirty="0" smtClean="0">
@@ -10402,15 +10481,7 @@
                   <a:srgbClr val="595959"/>
                 </a:solidFill>
               </a:rPr>
-              <a:t>Accord permissions to </a:t>
-            </a:r>
-            <a:r>
-              <a:rPr lang="en-US" dirty="0" smtClean="0">
-                <a:solidFill>
-                  <a:srgbClr val="595959"/>
-                </a:solidFill>
-              </a:rPr>
-              <a:t>the owner only (we set “1”)</a:t>
+              <a:t>Accord permissions to the owner only (we set “1”)</a:t>
             </a:r>
             <a:br>
               <a:rPr lang="en-US" dirty="0" smtClean="0">
@@ -10443,15 +10514,7 @@
                   <a:srgbClr val="595959"/>
                 </a:solidFill>
               </a:rPr>
-              <a:t>Dump the </a:t>
-            </a:r>
-            <a:r>
-              <a:rPr lang="en-US" dirty="0" smtClean="0">
-                <a:solidFill>
-                  <a:srgbClr val="595959"/>
-                </a:solidFill>
-              </a:rPr>
-              <a:t>SQL database</a:t>
+              <a:t>Dump the SQL database</a:t>
             </a:r>
             <a:br>
               <a:rPr lang="en-US" dirty="0" smtClean="0">
@@ -10632,18 +10695,7 @@
                   </a:schemeClr>
                 </a:solidFill>
               </a:rPr>
-              <a:t>The backups are saved </a:t>
-            </a:r>
-            <a:r>
-              <a:rPr lang="en-US" sz="2000" dirty="0" smtClean="0">
-                <a:solidFill>
-                  <a:schemeClr val="tx1">
-                    <a:lumMod val="65000"/>
-                    <a:lumOff val="35000"/>
-                  </a:schemeClr>
-                </a:solidFill>
-              </a:rPr>
-              <a:t>into a well organized folder</a:t>
+              <a:t>The backups are saved into a well organized folder</a:t>
             </a:r>
             <a:endParaRPr lang="en-US" sz="2000" dirty="0">
               <a:solidFill>
@@ -10881,51 +10933,7 @@
                   </a:schemeClr>
                 </a:solidFill>
               </a:rPr>
-              <a:t>The date and hour </a:t>
-            </a:r>
-            <a:r>
-              <a:rPr lang="en-US" dirty="0" smtClean="0">
-                <a:solidFill>
-                  <a:schemeClr val="tx1">
-                    <a:lumMod val="50000"/>
-                    <a:lumOff val="50000"/>
-                  </a:schemeClr>
-                </a:solidFill>
-              </a:rPr>
-              <a:t>are</a:t>
-            </a:r>
-            <a:r>
-              <a:rPr lang="en-US" dirty="0" smtClean="0">
-                <a:solidFill>
-                  <a:schemeClr val="tx1">
-                    <a:lumMod val="50000"/>
-                    <a:lumOff val="50000"/>
-                  </a:schemeClr>
-                </a:solidFill>
-              </a:rPr>
-              <a:t> </a:t>
-            </a:r>
-            <a:r>
-              <a:rPr lang="en-US" dirty="0" smtClean="0">
-                <a:solidFill>
-                  <a:schemeClr val="tx1">
-                    <a:lumMod val="50000"/>
-                    <a:lumOff val="50000"/>
-                  </a:schemeClr>
-                </a:solidFill>
-              </a:rPr>
-              <a:t>added to the </a:t>
-            </a:r>
-            <a:r>
-              <a:rPr lang="en-US" dirty="0" smtClean="0">
-                <a:solidFill>
-                  <a:schemeClr val="tx1">
-                    <a:lumMod val="50000"/>
-                    <a:lumOff val="50000"/>
-                  </a:schemeClr>
-                </a:solidFill>
-              </a:rPr>
-              <a:t>created folders</a:t>
+              <a:t>The date and hour are added to the created folders</a:t>
             </a:r>
             <a:endParaRPr lang="en-US" dirty="0">
               <a:solidFill>
@@ -12175,17 +12183,8 @@
             <a:pPr lvl="1"/>
             <a:r>
               <a:rPr lang="en-US" dirty="0" smtClean="0"/>
-              <a:t>OVH does not </a:t>
-            </a:r>
-            <a:r>
-              <a:rPr lang="en-US" dirty="0" smtClean="0"/>
-              <a:t>authorize some script </a:t>
-            </a:r>
-            <a:r>
-              <a:rPr lang="en-US" dirty="0" smtClean="0"/>
-              <a:t>commands</a:t>
-            </a:r>
-            <a:endParaRPr lang="en-US" dirty="0" smtClean="0"/>
+              <a:t>OVH does not authorize some script commands</a:t>
+            </a:r>
           </a:p>
           <a:p>
             <a:endParaRPr lang="en-US" dirty="0"/>

</xml_diff>

<commit_message>
Re adding presentation easyBackup
</commit_message>
<xml_diff>
--- a/projects/easyBackup/easyBackupPresentation.pptx
+++ b/projects/easyBackup/easyBackupPresentation.pptx
@@ -318,7 +318,7 @@
           <a:p>
             <a:fld id="{D728701E-CAF4-4159-9B3E-41C86DFFA30D}" type="datetimeFigureOut">
               <a:rPr lang="en-US" smtClean="0"/>
-              <a:t>12/06/2014</a:t>
+              <a:t>13/06/2014</a:t>
             </a:fld>
             <a:endParaRPr lang="en-US"/>
           </a:p>
@@ -772,7 +772,7 @@
           <a:p>
             <a:fld id="{D728701E-CAF4-4159-9B3E-41C86DFFA30D}" type="datetimeFigureOut">
               <a:rPr lang="en-US" smtClean="0"/>
-              <a:t>12/06/2014</a:t>
+              <a:t>13/06/2014</a:t>
             </a:fld>
             <a:endParaRPr lang="en-US"/>
           </a:p>
@@ -1427,7 +1427,7 @@
           <a:p>
             <a:fld id="{D728701E-CAF4-4159-9B3E-41C86DFFA30D}" type="datetimeFigureOut">
               <a:rPr lang="en-US" smtClean="0"/>
-              <a:t>12/06/2014</a:t>
+              <a:t>13/06/2014</a:t>
             </a:fld>
             <a:endParaRPr lang="en-US"/>
           </a:p>
@@ -1563,7 +1563,7 @@
           <a:p>
             <a:fld id="{D728701E-CAF4-4159-9B3E-41C86DFFA30D}" type="datetimeFigureOut">
               <a:rPr lang="en-US" smtClean="0"/>
-              <a:t>12/06/2014</a:t>
+              <a:t>13/06/2014</a:t>
             </a:fld>
             <a:endParaRPr lang="en-US"/>
           </a:p>
@@ -1929,7 +1929,7 @@
           <a:p>
             <a:fld id="{D728701E-CAF4-4159-9B3E-41C86DFFA30D}" type="datetimeFigureOut">
               <a:rPr lang="en-US" smtClean="0"/>
-              <a:t>12/06/2014</a:t>
+              <a:t>13/06/2014</a:t>
             </a:fld>
             <a:endParaRPr lang="en-US"/>
           </a:p>
@@ -2255,7 +2255,7 @@
           <a:p>
             <a:fld id="{D728701E-CAF4-4159-9B3E-41C86DFFA30D}" type="datetimeFigureOut">
               <a:rPr lang="en-US" smtClean="0"/>
-              <a:t>12/06/2014</a:t>
+              <a:t>13/06/2014</a:t>
             </a:fld>
             <a:endParaRPr lang="en-US"/>
           </a:p>
@@ -2553,7 +2553,7 @@
           <a:p>
             <a:fld id="{D728701E-CAF4-4159-9B3E-41C86DFFA30D}" type="datetimeFigureOut">
               <a:rPr lang="en-US" smtClean="0"/>
-              <a:t>12/06/2014</a:t>
+              <a:t>13/06/2014</a:t>
             </a:fld>
             <a:endParaRPr lang="en-US"/>
           </a:p>
@@ -2940,7 +2940,7 @@
           <a:p>
             <a:fld id="{D728701E-CAF4-4159-9B3E-41C86DFFA30D}" type="datetimeFigureOut">
               <a:rPr lang="en-US" smtClean="0"/>
-              <a:t>12/06/2014</a:t>
+              <a:t>13/06/2014</a:t>
             </a:fld>
             <a:endParaRPr lang="en-US"/>
           </a:p>
@@ -3360,7 +3360,7 @@
           <a:p>
             <a:fld id="{D728701E-CAF4-4159-9B3E-41C86DFFA30D}" type="datetimeFigureOut">
               <a:rPr lang="en-US" smtClean="0"/>
-              <a:t>12/06/2014</a:t>
+              <a:t>13/06/2014</a:t>
             </a:fld>
             <a:endParaRPr lang="en-US"/>
           </a:p>
@@ -3908,7 +3908,7 @@
           <a:p>
             <a:fld id="{D728701E-CAF4-4159-9B3E-41C86DFFA30D}" type="datetimeFigureOut">
               <a:rPr lang="en-US" smtClean="0"/>
-              <a:t>12/06/2014</a:t>
+              <a:t>13/06/2014</a:t>
             </a:fld>
             <a:endParaRPr lang="en-US"/>
           </a:p>
@@ -4294,7 +4294,7 @@
           <a:p>
             <a:fld id="{D728701E-CAF4-4159-9B3E-41C86DFFA30D}" type="datetimeFigureOut">
               <a:rPr lang="en-US" smtClean="0"/>
-              <a:t>12/06/2014</a:t>
+              <a:t>13/06/2014</a:t>
             </a:fld>
             <a:endParaRPr lang="en-US"/>
           </a:p>
@@ -4537,7 +4537,7 @@
           <a:p>
             <a:fld id="{D728701E-CAF4-4159-9B3E-41C86DFFA30D}" type="datetimeFigureOut">
               <a:rPr lang="en-US" smtClean="0"/>
-              <a:t>12/06/2014</a:t>
+              <a:t>13/06/2014</a:t>
             </a:fld>
             <a:endParaRPr lang="en-US"/>
           </a:p>
@@ -4872,7 +4872,7 @@
           <a:p>
             <a:fld id="{D728701E-CAF4-4159-9B3E-41C86DFFA30D}" type="datetimeFigureOut">
               <a:rPr lang="en-US" smtClean="0"/>
-              <a:t>12/06/2014</a:t>
+              <a:t>13/06/2014</a:t>
             </a:fld>
             <a:endParaRPr lang="en-US"/>
           </a:p>
@@ -5156,7 +5156,7 @@
           <a:p>
             <a:fld id="{D728701E-CAF4-4159-9B3E-41C86DFFA30D}" type="datetimeFigureOut">
               <a:rPr lang="en-US" smtClean="0"/>
-              <a:t>12/06/2014</a:t>
+              <a:t>13/06/2014</a:t>
             </a:fld>
             <a:endParaRPr lang="en-US"/>
           </a:p>
@@ -5545,7 +5545,7 @@
           <a:p>
             <a:fld id="{D728701E-CAF4-4159-9B3E-41C86DFFA30D}" type="datetimeFigureOut">
               <a:rPr lang="en-US" smtClean="0"/>
-              <a:t>12/06/2014</a:t>
+              <a:t>13/06/2014</a:t>
             </a:fld>
             <a:endParaRPr lang="en-US"/>
           </a:p>
@@ -6134,7 +6134,7 @@
           <a:p>
             <a:fld id="{D728701E-CAF4-4159-9B3E-41C86DFFA30D}" type="datetimeFigureOut">
               <a:rPr lang="en-US" smtClean="0"/>
-              <a:t>12/06/2014</a:t>
+              <a:t>13/06/2014</a:t>
             </a:fld>
             <a:endParaRPr lang="en-US"/>
           </a:p>
@@ -6705,7 +6705,7 @@
           <a:p>
             <a:fld id="{D728701E-CAF4-4159-9B3E-41C86DFFA30D}" type="datetimeFigureOut">
               <a:rPr lang="en-US" smtClean="0"/>
-              <a:t>12/06/2014</a:t>
+              <a:t>13/06/2014</a:t>
             </a:fld>
             <a:endParaRPr lang="en-US"/>
           </a:p>
@@ -7134,7 +7134,7 @@
           <a:p>
             <a:fld id="{D728701E-CAF4-4159-9B3E-41C86DFFA30D}" type="datetimeFigureOut">
               <a:rPr lang="en-US" smtClean="0"/>
-              <a:t>12/06/2014</a:t>
+              <a:t>13/06/2014</a:t>
             </a:fld>
             <a:endParaRPr lang="en-US"/>
           </a:p>
@@ -7561,7 +7561,7 @@
           <a:p>
             <a:fld id="{D728701E-CAF4-4159-9B3E-41C86DFFA30D}" type="datetimeFigureOut">
               <a:rPr lang="en-US" smtClean="0"/>
-              <a:t>12/06/2014</a:t>
+              <a:t>13/06/2014</a:t>
             </a:fld>
             <a:endParaRPr lang="en-US"/>
           </a:p>
@@ -8037,7 +8037,7 @@
           <a:p>
             <a:fld id="{D728701E-CAF4-4159-9B3E-41C86DFFA30D}" type="datetimeFigureOut">
               <a:rPr lang="en-US" smtClean="0"/>
-              <a:t>12/06/2014</a:t>
+              <a:t>13/06/2014</a:t>
             </a:fld>
             <a:endParaRPr lang="en-US"/>
           </a:p>
@@ -8504,7 +8504,7 @@
           <a:p>
             <a:fld id="{D728701E-CAF4-4159-9B3E-41C86DFFA30D}" type="datetimeFigureOut">
               <a:rPr lang="en-US" smtClean="0"/>
-              <a:t>12/06/2014</a:t>
+              <a:t>13/06/2014</a:t>
             </a:fld>
             <a:endParaRPr lang="en-US"/>
           </a:p>
@@ -9119,7 +9119,7 @@
         </p:nvSpPr>
         <p:spPr>
           <a:xfrm>
-            <a:off x="2332012" y="5930492"/>
+            <a:off x="2332012" y="5953376"/>
             <a:ext cx="3438649" cy="307777"/>
           </a:xfrm>
           <a:prstGeom prst="rect">

</xml_diff>